<commit_message>
Mise à jour docs pré-soutenance
</commit_message>
<xml_diff>
--- a/doc/Presentation_Minicraft.pptx
+++ b/doc/Presentation_Minicraft.pptx
@@ -115,6 +115,22 @@
       </a:defRPr>
     </a:lvl9pPr>
   </p:defaultTextStyle>
+  <p:extLst>
+    <p:ext uri="{EFAFB233-063F-42B5-8137-9DF3F51BA10A}">
+      <p15:sldGuideLst xmlns:p15="http://schemas.microsoft.com/office/powerpoint/2012/main">
+        <p15:guide id="1" orient="horz" pos="2160">
+          <p15:clr>
+            <a:srgbClr val="A4A3A4"/>
+          </p15:clr>
+        </p15:guide>
+        <p15:guide id="2" pos="2880">
+          <p15:clr>
+            <a:srgbClr val="A4A3A4"/>
+          </p15:clr>
+        </p15:guide>
+      </p15:sldGuideLst>
+    </p:ext>
+  </p:extLst>
 </p:presentation>
 </file>
 
@@ -536,6 +552,16 @@
               <a:rPr lang="fr-FR" baseline="0" dirty="0" smtClean="0"/>
               <a:t> très connu. </a:t>
             </a:r>
+            <a:endParaRPr lang="fr-FR" baseline="0" dirty="0" smtClean="0"/>
+          </a:p>
+          <a:p>
+            <a:endParaRPr lang="fr-FR" baseline="0" dirty="0" smtClean="0"/>
+          </a:p>
+          <a:p>
+            <a:r>
+              <a:rPr lang="fr-FR" baseline="0" dirty="0" smtClean="0"/>
+              <a:t>Je tiens à dire que les initiales ça fait ROBE !</a:t>
+            </a:r>
             <a:endParaRPr lang="fr-FR" dirty="0"/>
           </a:p>
         </p:txBody>
@@ -639,7 +665,19 @@
             </a:pPr>
             <a:r>
               <a:rPr lang="fr-FR" baseline="0" dirty="0" smtClean="0"/>
-              <a:t>Benjamin : Nous allons tout d’abord énoncé les objectifs du projet, ensuite nous parlerons des outils utilisées et de l’implémentation du jeu, ensuite nous allons évoqué les difficultés rencontrées. Enfin nous terminerons par une démo et notre bilan personnel.</a:t>
+              <a:t>Benjamin : Nous allons tout d’abord énoncé les objectifs du projet, ensuite nous parlerons des </a:t>
+            </a:r>
+            <a:r>
+              <a:rPr lang="fr-FR" baseline="0" smtClean="0"/>
+              <a:t>outils </a:t>
+            </a:r>
+            <a:r>
+              <a:rPr lang="fr-FR" baseline="0" smtClean="0"/>
+              <a:t>utilisés </a:t>
+            </a:r>
+            <a:r>
+              <a:rPr lang="fr-FR" baseline="0" dirty="0" smtClean="0"/>
+              <a:t>et de l’implémentation du jeu, ensuite nous allons évoqué les difficultés rencontrées. Enfin nous terminerons par une démo et notre bilan personnel.</a:t>
             </a:r>
             <a:endParaRPr lang="fr-FR" dirty="0" smtClean="0"/>
           </a:p>
@@ -740,7 +778,43 @@
           <a:p>
             <a:r>
               <a:rPr lang="fr-FR" baseline="0" dirty="0" smtClean="0"/>
-              <a:t>Objectif commun : Anthony</a:t>
+              <a:t>Objectif commun : </a:t>
+            </a:r>
+            <a:r>
+              <a:rPr lang="fr-FR" baseline="0" dirty="0" smtClean="0"/>
+              <a:t>Anthony</a:t>
+            </a:r>
+          </a:p>
+          <a:p>
+            <a:r>
+              <a:rPr lang="fr-FR" baseline="0" dirty="0" smtClean="0"/>
+              <a:t>Git : Partage de ressources pour travailler à plusieurs  à distance sur un même projet</a:t>
+            </a:r>
+          </a:p>
+          <a:p>
+            <a:r>
+              <a:rPr lang="fr-FR" baseline="0" dirty="0" err="1" smtClean="0"/>
+              <a:t>Scrum</a:t>
+            </a:r>
+            <a:r>
+              <a:rPr lang="fr-FR" baseline="0" dirty="0" smtClean="0"/>
+              <a:t> : Découpage en sprint, user  stories , élaboration des tâches et priorités (</a:t>
+            </a:r>
+            <a:r>
+              <a:rPr lang="fr-FR" baseline="0" dirty="0" err="1" smtClean="0"/>
+              <a:t>burndown</a:t>
+            </a:r>
+            <a:r>
+              <a:rPr lang="fr-FR" baseline="0" dirty="0" smtClean="0"/>
+              <a:t> </a:t>
+            </a:r>
+            <a:r>
+              <a:rPr lang="fr-FR" baseline="0" dirty="0" err="1" smtClean="0"/>
+              <a:t>chart</a:t>
+            </a:r>
+            <a:r>
+              <a:rPr lang="fr-FR" baseline="0" dirty="0" smtClean="0"/>
+              <a:t>), estimation de temps, répartition de tâches, suivi évolution </a:t>
             </a:r>
             <a:endParaRPr lang="fr-FR" dirty="0"/>
           </a:p>
@@ -832,7 +906,15 @@
             </a:r>
             <a:r>
               <a:rPr lang="fr-FR" baseline="0" dirty="0" smtClean="0"/>
-              <a:t> : Détailler le sprint1 + Montrer le </a:t>
+              <a:t> : Détailler le sprint1 + </a:t>
+            </a:r>
+            <a:r>
+              <a:rPr lang="fr-FR" baseline="0" dirty="0" smtClean="0"/>
+              <a:t>MONTRER </a:t>
+            </a:r>
+            <a:r>
+              <a:rPr lang="fr-FR" baseline="0" dirty="0" smtClean="0"/>
+              <a:t>le </a:t>
             </a:r>
             <a:r>
               <a:rPr lang="fr-FR" baseline="0" dirty="0" err="1" smtClean="0"/>
@@ -840,20 +922,39 @@
             </a:r>
             <a:r>
               <a:rPr lang="fr-FR" baseline="0" dirty="0" smtClean="0"/>
-              <a:t> chart du sprint1</a:t>
-            </a:r>
-          </a:p>
-          <a:p>
+              <a:t> chart du </a:t>
+            </a:r>
+            <a:r>
+              <a:rPr lang="fr-FR" baseline="0" dirty="0" smtClean="0"/>
+              <a:t>sprint1</a:t>
+            </a:r>
+          </a:p>
+          <a:p>
+            <a:r>
+              <a:rPr lang="fr-FR" baseline="0" dirty="0" smtClean="0"/>
+              <a:t>Basic de Mine </a:t>
+            </a:r>
+            <a:r>
+              <a:rPr lang="fr-FR" baseline="0" dirty="0" err="1" smtClean="0"/>
+              <a:t>craft</a:t>
+            </a:r>
+            <a:r>
+              <a:rPr lang="fr-FR" baseline="0" dirty="0" smtClean="0"/>
+              <a:t> : 1P et gravité , déplacer, sauter, déposer retirer bloc, textures, collisions</a:t>
+            </a:r>
             <a:endParaRPr lang="fr-FR" baseline="0" dirty="0" smtClean="0"/>
           </a:p>
           <a:p>
+            <a:endParaRPr lang="fr-FR" baseline="0" dirty="0" smtClean="0"/>
+          </a:p>
+          <a:p>
             <a:r>
               <a:rPr lang="fr-FR" baseline="0" dirty="0" smtClean="0"/>
-              <a:t>Sprint2 (Benjamin</a:t>
+              <a:t>Sprint2 (Benjamin) : Tâches à effectuer </a:t>
             </a:r>
             <a:r>
               <a:rPr lang="fr-FR" baseline="0" dirty="0" smtClean="0"/>
-              <a:t>) : Tâches à effectuer + </a:t>
+              <a:t>+ MONTRER  </a:t>
             </a:r>
             <a:r>
               <a:rPr lang="fr-FR" baseline="0" dirty="0" err="1" smtClean="0"/>
@@ -869,7 +970,17 @@
             </a:r>
             <a:r>
               <a:rPr lang="fr-FR" baseline="0" dirty="0" smtClean="0"/>
-              <a:t> du sprint2</a:t>
+              <a:t> du </a:t>
+            </a:r>
+            <a:r>
+              <a:rPr lang="fr-FR" baseline="0" dirty="0" smtClean="0"/>
+              <a:t>sprint2</a:t>
+            </a:r>
+          </a:p>
+          <a:p>
+            <a:r>
+              <a:rPr lang="fr-FR" baseline="0" dirty="0" smtClean="0"/>
+              <a:t>Plus conséquent : taille joueur, maitrise du posage de bloc (sur soi), structures prédéfinies, macros, aider le joueur (HUD, menu)</a:t>
             </a:r>
             <a:endParaRPr lang="fr-FR" dirty="0"/>
           </a:p>
@@ -957,7 +1068,65 @@
           <a:p>
             <a:r>
               <a:rPr lang="fr-FR" dirty="0" smtClean="0"/>
-              <a:t>Outil : Anthony</a:t>
+              <a:t>Outil : </a:t>
+            </a:r>
+            <a:r>
+              <a:rPr lang="fr-FR" dirty="0" smtClean="0"/>
+              <a:t>Anthony</a:t>
+            </a:r>
+          </a:p>
+          <a:p>
+            <a:r>
+              <a:rPr lang="fr-FR" dirty="0" smtClean="0"/>
+              <a:t>Explications de </a:t>
+            </a:r>
+            <a:r>
+              <a:rPr lang="fr-FR" dirty="0" err="1" smtClean="0"/>
+              <a:t>Jmonkey</a:t>
+            </a:r>
+            <a:r>
+              <a:rPr lang="fr-FR" dirty="0" smtClean="0"/>
+              <a:t> </a:t>
+            </a:r>
+            <a:r>
+              <a:rPr lang="fr-FR" dirty="0" err="1" smtClean="0"/>
+              <a:t>Engine</a:t>
+            </a:r>
+            <a:r>
+              <a:rPr lang="fr-FR" baseline="0" dirty="0" smtClean="0"/>
+              <a:t> 3 : moteur 3D pour réaliser des jeux (JOLI)</a:t>
+            </a:r>
+          </a:p>
+          <a:p>
+            <a:r>
+              <a:rPr lang="fr-FR" baseline="0" dirty="0" smtClean="0"/>
+              <a:t>Possède son propre SDK pour développer (mais nous </a:t>
+            </a:r>
+            <a:r>
+              <a:rPr lang="fr-FR" baseline="0" dirty="0" err="1" smtClean="0"/>
+              <a:t>eclipse</a:t>
+            </a:r>
+            <a:r>
+              <a:rPr lang="fr-FR" baseline="0" dirty="0" smtClean="0"/>
+              <a:t>)</a:t>
+            </a:r>
+          </a:p>
+          <a:p>
+            <a:r>
+              <a:rPr lang="fr-FR" baseline="0" dirty="0" smtClean="0"/>
+              <a:t>Certains nombre de choses déjà implémentées : Player, nœuds, </a:t>
+            </a:r>
+            <a:r>
+              <a:rPr lang="fr-FR" baseline="0" dirty="0" err="1" smtClean="0"/>
+              <a:t>nifty</a:t>
+            </a:r>
+            <a:r>
+              <a:rPr lang="fr-FR" baseline="0" dirty="0" smtClean="0"/>
+              <a:t> pour écrans, </a:t>
+            </a:r>
+            <a:r>
+              <a:rPr lang="fr-FR" baseline="0" dirty="0" err="1" smtClean="0"/>
+              <a:t>etc</a:t>
             </a:r>
             <a:endParaRPr lang="fr-FR" dirty="0"/>
           </a:p>
@@ -1045,7 +1214,31 @@
           <a:p>
             <a:r>
               <a:rPr lang="fr-FR" dirty="0" smtClean="0"/>
-              <a:t>Diapo : Victor</a:t>
+              <a:t>Diapo : </a:t>
+            </a:r>
+            <a:r>
+              <a:rPr lang="fr-FR" dirty="0" smtClean="0"/>
+              <a:t>Victor</a:t>
+            </a:r>
+          </a:p>
+          <a:p>
+            <a:r>
+              <a:rPr lang="fr-FR" dirty="0" smtClean="0"/>
+              <a:t>…</a:t>
+            </a:r>
+          </a:p>
+          <a:p>
+            <a:r>
+              <a:rPr lang="fr-FR" dirty="0" err="1" smtClean="0"/>
+              <a:t>Assets</a:t>
+            </a:r>
+            <a:r>
+              <a:rPr lang="fr-FR" dirty="0" smtClean="0"/>
+              <a:t> : les éléments</a:t>
+            </a:r>
+            <a:r>
+              <a:rPr lang="fr-FR" baseline="0" dirty="0" smtClean="0"/>
+              <a:t> multimédias à importer : sons, textures</a:t>
             </a:r>
             <a:endParaRPr lang="fr-FR" dirty="0"/>
           </a:p>
@@ -1141,12 +1334,143 @@
             </a:r>
           </a:p>
           <a:p>
+            <a:r>
+              <a:rPr lang="fr-FR" baseline="0" dirty="0" err="1" smtClean="0"/>
+              <a:t>Jmonkey</a:t>
+            </a:r>
+            <a:r>
+              <a:rPr lang="fr-FR" baseline="0" dirty="0" smtClean="0"/>
+              <a:t> : parti de zéro pour maîtriser l’outil, long même si beaucoup de </a:t>
+            </a:r>
+            <a:r>
+              <a:rPr lang="fr-FR" baseline="0" dirty="0" err="1" smtClean="0"/>
+              <a:t>tuto</a:t>
+            </a:r>
             <a:endParaRPr lang="fr-FR" baseline="0" dirty="0" smtClean="0"/>
           </a:p>
           <a:p>
+            <a:pPr marL="0" marR="0" indent="0" algn="l" defTabSz="914400" rtl="0" eaLnBrk="1" fontAlgn="auto" latinLnBrk="0" hangingPunct="1">
+              <a:lnSpc>
+                <a:spcPct val="100000"/>
+              </a:lnSpc>
+              <a:spcBef>
+                <a:spcPts val="0"/>
+              </a:spcBef>
+              <a:spcAft>
+                <a:spcPts val="0"/>
+              </a:spcAft>
+              <a:buClrTx/>
+              <a:buSzTx/>
+              <a:buFontTx/>
+              <a:buNone/>
+              <a:tabLst/>
+              <a:defRPr/>
+            </a:pPr>
             <a:r>
               <a:rPr lang="fr-FR" baseline="0" dirty="0" smtClean="0"/>
-              <a:t>A la fin de la diapo : Démo par Benjamin</a:t>
+              <a:t>Pb d’implémentation de </a:t>
+            </a:r>
+            <a:r>
+              <a:rPr lang="fr-FR" baseline="0" dirty="0" err="1" smtClean="0"/>
+              <a:t>Jmonkey</a:t>
+            </a:r>
+            <a:r>
+              <a:rPr lang="fr-FR" baseline="0" dirty="0" smtClean="0"/>
+              <a:t> (gestion de </a:t>
+            </a:r>
+            <a:r>
+              <a:rPr lang="fr-FR" baseline="0" dirty="0" err="1" smtClean="0"/>
+              <a:t>clik</a:t>
+            </a:r>
+            <a:r>
+              <a:rPr lang="fr-FR" baseline="0" dirty="0" smtClean="0"/>
+              <a:t> souris), moyennement documenté à part les </a:t>
+            </a:r>
+            <a:r>
+              <a:rPr lang="fr-FR" baseline="0" dirty="0" err="1" smtClean="0"/>
+              <a:t>tutos</a:t>
+            </a:r>
+            <a:endParaRPr lang="fr-FR" baseline="0" dirty="0" smtClean="0"/>
+          </a:p>
+          <a:p>
+            <a:r>
+              <a:rPr lang="fr-FR" baseline="0" dirty="0" err="1" smtClean="0"/>
+              <a:t>Tuto</a:t>
+            </a:r>
+            <a:r>
+              <a:rPr lang="fr-FR" baseline="0" dirty="0" smtClean="0"/>
+              <a:t>  </a:t>
+            </a:r>
+            <a:r>
+              <a:rPr lang="fr-FR" baseline="0" dirty="0" err="1" smtClean="0"/>
+              <a:t>CharacterControl</a:t>
+            </a:r>
+            <a:r>
+              <a:rPr lang="fr-FR" baseline="0" dirty="0" smtClean="0"/>
+              <a:t> </a:t>
+            </a:r>
+            <a:r>
+              <a:rPr lang="fr-FR" baseline="0" dirty="0" err="1" smtClean="0"/>
+              <a:t>dépreciated</a:t>
+            </a:r>
+            <a:endParaRPr lang="fr-FR" baseline="0" dirty="0" smtClean="0"/>
+          </a:p>
+          <a:p>
+            <a:r>
+              <a:rPr lang="fr-FR" baseline="0" dirty="0" smtClean="0"/>
+              <a:t>Grosses difficultés avec Git, très peu abordé en cours -&gt; </a:t>
+            </a:r>
+            <a:r>
+              <a:rPr lang="fr-FR" baseline="0" dirty="0" err="1" smtClean="0"/>
+              <a:t>Merge</a:t>
+            </a:r>
+            <a:r>
+              <a:rPr lang="fr-FR" baseline="0" dirty="0" smtClean="0"/>
+              <a:t> (plugin Eclipse)</a:t>
+            </a:r>
+          </a:p>
+          <a:p>
+            <a:r>
+              <a:rPr lang="fr-FR" baseline="0" dirty="0" smtClean="0"/>
+              <a:t>Collision : voir à travers les blocs, être planté dans des blocs</a:t>
+            </a:r>
+          </a:p>
+          <a:p>
+            <a:r>
+              <a:rPr lang="fr-FR" baseline="0" dirty="0" smtClean="0"/>
+              <a:t>Taille du personnage (trop grand puis trop petit)</a:t>
+            </a:r>
+          </a:p>
+          <a:p>
+            <a:r>
+              <a:rPr lang="fr-FR" baseline="0" dirty="0" smtClean="0"/>
+              <a:t>Menu : interagir avec </a:t>
+            </a:r>
+            <a:r>
+              <a:rPr lang="fr-FR" baseline="0" dirty="0" err="1" smtClean="0"/>
+              <a:t>Nifty</a:t>
+            </a:r>
+            <a:endParaRPr lang="fr-FR" baseline="0" dirty="0" smtClean="0"/>
+          </a:p>
+          <a:p>
+            <a:endParaRPr lang="fr-FR" baseline="0" dirty="0" smtClean="0"/>
+          </a:p>
+          <a:p>
+            <a:r>
+              <a:rPr lang="fr-FR" baseline="0" dirty="0" smtClean="0"/>
+              <a:t>A la fin de la diapo : </a:t>
+            </a:r>
+            <a:r>
+              <a:rPr lang="fr-FR" baseline="0" dirty="0" smtClean="0"/>
+              <a:t>DEMO </a:t>
+            </a:r>
+            <a:r>
+              <a:rPr lang="fr-FR" baseline="0" dirty="0" smtClean="0"/>
+              <a:t>par </a:t>
+            </a:r>
+            <a:r>
+              <a:rPr lang="fr-FR" baseline="0" dirty="0" smtClean="0"/>
+              <a:t>Benjamin </a:t>
             </a:r>
             <a:endParaRPr lang="fr-FR" dirty="0"/>
           </a:p>
@@ -1238,11 +1562,33 @@
             </a:r>
             <a:r>
               <a:rPr lang="fr-FR" baseline="0" dirty="0" smtClean="0"/>
-              <a:t> Tout le </a:t>
-            </a:r>
+              <a:t> Tout le monde</a:t>
+            </a:r>
+          </a:p>
+          <a:p>
+            <a:endParaRPr lang="fr-FR" baseline="0" dirty="0" smtClean="0"/>
+          </a:p>
+          <a:p>
+            <a:pPr marL="0" marR="0" indent="0" algn="l" defTabSz="914400" rtl="0" eaLnBrk="1" fontAlgn="auto" latinLnBrk="0" hangingPunct="1">
+              <a:lnSpc>
+                <a:spcPct val="100000"/>
+              </a:lnSpc>
+              <a:spcBef>
+                <a:spcPts val="0"/>
+              </a:spcBef>
+              <a:spcAft>
+                <a:spcPts val="0"/>
+              </a:spcAft>
+              <a:buClrTx/>
+              <a:buSzTx/>
+              <a:buFontTx/>
+              <a:buNone/>
+              <a:tabLst/>
+              <a:defRPr/>
+            </a:pPr>
             <a:r>
               <a:rPr lang="fr-FR" baseline="0" dirty="0" smtClean="0"/>
-              <a:t>monde</a:t>
+              <a:t>Le projet le plus intéressant</a:t>
             </a:r>
           </a:p>
           <a:p>
@@ -1289,7 +1635,11 @@
             </a:pPr>
             <a:r>
               <a:rPr lang="fr-FR" baseline="0" dirty="0" smtClean="0"/>
-              <a:t>Plus de forme possible</a:t>
+              <a:t>Plus de </a:t>
+            </a:r>
+            <a:r>
+              <a:rPr lang="fr-FR" baseline="0" dirty="0" smtClean="0"/>
+              <a:t>formes possible</a:t>
             </a:r>
           </a:p>
           <a:p>
@@ -1299,11 +1649,7 @@
             </a:pPr>
             <a:r>
               <a:rPr lang="fr-FR" baseline="0" dirty="0" smtClean="0"/>
-              <a:t>Exporter les constructions à un format importable dans </a:t>
-            </a:r>
-            <a:r>
-              <a:rPr lang="fr-FR" baseline="0" dirty="0" err="1" smtClean="0"/>
-              <a:t>Minecraft</a:t>
+              <a:t>Renommer et sauvegarder macros</a:t>
             </a:r>
             <a:endParaRPr lang="fr-FR" baseline="0" dirty="0" smtClean="0"/>
           </a:p>
@@ -1314,13 +1660,96 @@
             </a:pPr>
             <a:r>
               <a:rPr lang="fr-FR" baseline="0" dirty="0" smtClean="0"/>
-              <a:t>Améliorer graphisme (Joueur + complet, prévisualisation des </a:t>
-            </a:r>
-            <a:r>
-              <a:rPr lang="fr-FR" baseline="0" smtClean="0"/>
-              <a:t>structures etc..)</a:t>
-            </a:r>
-            <a:endParaRPr lang="fr-FR" dirty="0"/>
+              <a:t>Exporter les constructions à un format importable dans </a:t>
+            </a:r>
+            <a:r>
+              <a:rPr lang="fr-FR" baseline="0" dirty="0" err="1" smtClean="0"/>
+              <a:t>Minecraft</a:t>
+            </a:r>
+            <a:endParaRPr lang="fr-FR" baseline="0" dirty="0" smtClean="0"/>
+          </a:p>
+          <a:p>
+            <a:pPr marL="171450" indent="-171450">
+              <a:buFontTx/>
+              <a:buChar char="-"/>
+            </a:pPr>
+            <a:r>
+              <a:rPr lang="fr-FR" baseline="0" dirty="0" smtClean="0"/>
+              <a:t>Améliorer </a:t>
+            </a:r>
+            <a:r>
+              <a:rPr lang="fr-FR" baseline="0" dirty="0" smtClean="0"/>
+              <a:t>graphisme et design </a:t>
+            </a:r>
+            <a:r>
+              <a:rPr lang="fr-FR" baseline="0" dirty="0" smtClean="0"/>
+              <a:t>(Joueur + complet, prévisualisation des structures etc</a:t>
+            </a:r>
+            <a:r>
+              <a:rPr lang="fr-FR" baseline="0" dirty="0" smtClean="0"/>
+              <a:t>..)</a:t>
+            </a:r>
+          </a:p>
+          <a:p>
+            <a:pPr marL="171450" indent="-171450">
+              <a:buFontTx/>
+              <a:buChar char="-"/>
+            </a:pPr>
+            <a:r>
+              <a:rPr lang="fr-FR" baseline="0" dirty="0" smtClean="0"/>
+              <a:t>Mettre du son (enlever, ajouter des blocs, macro, téléportation)</a:t>
+            </a:r>
+          </a:p>
+          <a:p>
+            <a:pPr marL="171450" indent="-171450">
+              <a:buFontTx/>
+              <a:buChar char="-"/>
+            </a:pPr>
+            <a:r>
+              <a:rPr lang="fr-FR" baseline="0" dirty="0" smtClean="0"/>
+              <a:t>Créer un menu au lancement du  jeu (charger </a:t>
+            </a:r>
+            <a:r>
+              <a:rPr lang="fr-FR" baseline="0" dirty="0" err="1" smtClean="0"/>
+              <a:t>partie+importer</a:t>
+            </a:r>
+            <a:r>
+              <a:rPr lang="fr-FR" baseline="0" dirty="0" smtClean="0"/>
+              <a:t> macros, nouvelle carte (plusieurs </a:t>
+            </a:r>
+            <a:r>
+              <a:rPr lang="fr-FR" baseline="0" dirty="0" err="1" smtClean="0"/>
+              <a:t>fonds,etc</a:t>
+            </a:r>
+            <a:r>
+              <a:rPr lang="fr-FR" baseline="0" dirty="0" smtClean="0"/>
+              <a:t>))</a:t>
+            </a:r>
+          </a:p>
+          <a:p>
+            <a:pPr marL="171450" indent="-171450">
+              <a:buFontTx/>
+              <a:buChar char="-"/>
+            </a:pPr>
+            <a:r>
+              <a:rPr lang="fr-FR" baseline="0" dirty="0" smtClean="0"/>
+              <a:t>Améliorer HUD (</a:t>
+            </a:r>
+            <a:r>
+              <a:rPr lang="fr-FR" baseline="0" dirty="0" err="1" smtClean="0"/>
+              <a:t>rec</a:t>
+            </a:r>
+            <a:r>
+              <a:rPr lang="fr-FR" baseline="0" dirty="0" smtClean="0"/>
+              <a:t> macro)</a:t>
+            </a:r>
+          </a:p>
+          <a:p>
+            <a:pPr marL="171450" indent="-171450">
+              <a:buFontTx/>
+              <a:buChar char="-"/>
+            </a:pPr>
+            <a:endParaRPr lang="fr-FR" baseline="0" dirty="0" smtClean="0"/>
           </a:p>
         </p:txBody>
       </p:sp>
@@ -1351,6 +1780,108 @@
     <p:extLst>
       <p:ext uri="{BB962C8B-B14F-4D97-AF65-F5344CB8AC3E}">
         <p14:creationId xmlns:p14="http://schemas.microsoft.com/office/powerpoint/2010/main" val="1764784018"/>
+      </p:ext>
+    </p:extLst>
+  </p:cSld>
+  <p:clrMapOvr>
+    <a:masterClrMapping/>
+  </p:clrMapOvr>
+</p:notes>
+</file>
+
+<file path=ppt/notesSlides/notesSlide9.xml><?xml version="1.0" encoding="utf-8"?>
+<p:notes xmlns:a="http://schemas.openxmlformats.org/drawingml/2006/main" xmlns:r="http://schemas.openxmlformats.org/officeDocument/2006/relationships" xmlns:p="http://schemas.openxmlformats.org/presentationml/2006/main">
+  <p:cSld>
+    <p:spTree>
+      <p:nvGrpSpPr>
+        <p:cNvPr id="1" name=""/>
+        <p:cNvGrpSpPr/>
+        <p:nvPr/>
+      </p:nvGrpSpPr>
+      <p:grpSpPr>
+        <a:xfrm>
+          <a:off x="0" y="0"/>
+          <a:ext cx="0" cy="0"/>
+          <a:chOff x="0" y="0"/>
+          <a:chExt cx="0" cy="0"/>
+        </a:xfrm>
+      </p:grpSpPr>
+      <p:sp>
+        <p:nvSpPr>
+          <p:cNvPr id="2" name="Espace réservé de l'image des diapositives 1"/>
+          <p:cNvSpPr>
+            <a:spLocks noGrp="1" noRot="1" noChangeAspect="1"/>
+          </p:cNvSpPr>
+          <p:nvPr>
+            <p:ph type="sldImg"/>
+          </p:nvPr>
+        </p:nvSpPr>
+        <p:spPr/>
+      </p:sp>
+      <p:sp>
+        <p:nvSpPr>
+          <p:cNvPr id="3" name="Espace réservé des commentaires 2"/>
+          <p:cNvSpPr>
+            <a:spLocks noGrp="1"/>
+          </p:cNvSpPr>
+          <p:nvPr>
+            <p:ph type="body" idx="1"/>
+          </p:nvPr>
+        </p:nvSpPr>
+        <p:spPr/>
+        <p:txBody>
+          <a:bodyPr/>
+          <a:lstStyle/>
+          <a:p>
+            <a:r>
+              <a:rPr lang="fr-FR" dirty="0" err="1" smtClean="0"/>
+              <a:t>Like</a:t>
+            </a:r>
+            <a:r>
+              <a:rPr lang="fr-FR" dirty="0" smtClean="0"/>
+              <a:t> a</a:t>
+            </a:r>
+            <a:r>
+              <a:rPr lang="fr-FR" baseline="0" dirty="0" smtClean="0"/>
+              <a:t> boss </a:t>
+            </a:r>
+            <a:r>
+              <a:rPr lang="fr-FR" baseline="0" dirty="0" smtClean="0">
+                <a:sym typeface="Wingdings" panose="05000000000000000000" pitchFamily="2" charset="2"/>
+              </a:rPr>
+              <a:t></a:t>
+            </a:r>
+            <a:endParaRPr lang="fr-FR" dirty="0"/>
+          </a:p>
+        </p:txBody>
+      </p:sp>
+      <p:sp>
+        <p:nvSpPr>
+          <p:cNvPr id="4" name="Espace réservé du numéro de diapositive 3"/>
+          <p:cNvSpPr>
+            <a:spLocks noGrp="1"/>
+          </p:cNvSpPr>
+          <p:nvPr>
+            <p:ph type="sldNum" sz="quarter" idx="10"/>
+          </p:nvPr>
+        </p:nvSpPr>
+        <p:spPr/>
+        <p:txBody>
+          <a:bodyPr/>
+          <a:lstStyle/>
+          <a:p>
+            <a:fld id="{D032A23F-5570-49CD-A3E6-C4811BF41EB9}" type="slidenum">
+              <a:rPr lang="fr-FR" smtClean="0"/>
+              <a:t>9</a:t>
+            </a:fld>
+            <a:endParaRPr lang="fr-FR"/>
+          </a:p>
+        </p:txBody>
+      </p:sp>
+    </p:spTree>
+    <p:extLst>
+      <p:ext uri="{BB962C8B-B14F-4D97-AF65-F5344CB8AC3E}">
+        <p14:creationId xmlns:p14="http://schemas.microsoft.com/office/powerpoint/2010/main" val="1426682172"/>
       </p:ext>
     </p:extLst>
   </p:cSld>
@@ -5097,21 +5628,34 @@
           <a:p>
             <a:r>
               <a:rPr lang="fr-FR" dirty="0" smtClean="0"/>
-              <a:t>OLEA Anthony</a:t>
-            </a:r>
-          </a:p>
-          <a:p>
+              <a:t>OLEA </a:t>
+            </a:r>
             <a:r>
               <a:rPr lang="fr-FR" dirty="0" smtClean="0"/>
-              <a:t>ESCARIEUX Guillaume</a:t>
-            </a:r>
-          </a:p>
-          <a:p>
+              <a:t>Anthony</a:t>
+            </a:r>
+          </a:p>
+          <a:p>
+            <a:r>
+              <a:rPr lang="fr-FR" dirty="0"/>
+              <a:t>BRAUD </a:t>
+            </a:r>
             <a:r>
               <a:rPr lang="fr-FR" dirty="0" smtClean="0"/>
-              <a:t>BRAUD Benjamin</a:t>
-            </a:r>
-            <a:endParaRPr lang="fr-FR" dirty="0"/>
+              <a:t>Benjamin</a:t>
+            </a:r>
+            <a:endParaRPr lang="fr-FR" dirty="0" smtClean="0"/>
+          </a:p>
+          <a:p>
+            <a:r>
+              <a:rPr lang="fr-FR" dirty="0" smtClean="0"/>
+              <a:t>ESCARIEUX </a:t>
+            </a:r>
+            <a:r>
+              <a:rPr lang="fr-FR" dirty="0" smtClean="0"/>
+              <a:t>Guillaume</a:t>
+            </a:r>
+            <a:endParaRPr lang="fr-FR" dirty="0" smtClean="0"/>
           </a:p>
         </p:txBody>
       </p:sp>
@@ -5906,6 +6450,13 @@
   <p:clrMapOvr>
     <a:masterClrMapping/>
   </p:clrMapOvr>
+  <p:timing>
+    <p:tnLst>
+      <p:par>
+        <p:cTn id="1" dur="indefinite" restart="never" nodeType="tmRoot"/>
+      </p:par>
+    </p:tnLst>
+  </p:timing>
 </p:sld>
 </file>
 
@@ -5959,7 +6510,12 @@
             <p:ph idx="1"/>
           </p:nvPr>
         </p:nvSpPr>
-        <p:spPr/>
+        <p:spPr>
+          <a:xfrm>
+            <a:off x="6361" y="1563624"/>
+            <a:ext cx="8229600" cy="4625609"/>
+          </a:xfrm>
+        </p:spPr>
         <p:txBody>
           <a:bodyPr/>
           <a:lstStyle/>
@@ -6042,6 +6598,36 @@
           </a:p>
         </p:txBody>
       </p:sp>
+      <p:pic>
+        <p:nvPicPr>
+          <p:cNvPr id="4" name="Image 3"/>
+          <p:cNvPicPr>
+            <a:picLocks noChangeAspect="1"/>
+          </p:cNvPicPr>
+          <p:nvPr/>
+        </p:nvPicPr>
+        <p:blipFill>
+          <a:blip r:embed="rId3">
+            <a:extLst>
+              <a:ext uri="{28A0092B-C50C-407E-A947-70E740481C1C}">
+                <a14:useLocalDpi xmlns:a14="http://schemas.microsoft.com/office/drawing/2010/main" val="0"/>
+              </a:ext>
+            </a:extLst>
+          </a:blip>
+          <a:stretch>
+            <a:fillRect/>
+          </a:stretch>
+        </p:blipFill>
+        <p:spPr>
+          <a:xfrm>
+            <a:off x="6516216" y="0"/>
+            <a:ext cx="2627784" cy="6858000"/>
+          </a:xfrm>
+          <a:prstGeom prst="rect">
+            <a:avLst/>
+          </a:prstGeom>
+        </p:spPr>
+      </p:pic>
     </p:spTree>
     <p:extLst>
       <p:ext uri="{BB962C8B-B14F-4D97-AF65-F5344CB8AC3E}">
@@ -6052,6 +6638,13 @@
   <p:clrMapOvr>
     <a:masterClrMapping/>
   </p:clrMapOvr>
+  <p:timing>
+    <p:tnLst>
+      <p:par>
+        <p:cTn id="1" dur="indefinite" restart="never" nodeType="tmRoot"/>
+      </p:par>
+    </p:tnLst>
+  </p:timing>
 </p:sld>
 </file>
 
@@ -6182,6 +6775,13 @@
   <p:clrMapOvr>
     <a:masterClrMapping/>
   </p:clrMapOvr>
+  <p:timing>
+    <p:tnLst>
+      <p:par>
+        <p:cTn id="1" dur="indefinite" restart="never" nodeType="tmRoot"/>
+      </p:par>
+    </p:tnLst>
+  </p:timing>
 </p:sld>
 </file>
 
@@ -6362,7 +6962,7 @@
           <p:nvPr/>
         </p:nvPicPr>
         <p:blipFill>
-          <a:blip r:embed="rId2">
+          <a:blip r:embed="rId3">
             <a:extLst>
               <a:ext uri="{28A0092B-C50C-407E-A947-70E740481C1C}">
                 <a14:useLocalDpi xmlns:a14="http://schemas.microsoft.com/office/drawing/2010/main" val="0"/>

</xml_diff>

<commit_message>
MaJ sur les slides Objectifs, Contributions et correction orthographique sur le slide du sommaire
</commit_message>
<xml_diff>
--- a/doc/Presentation_Minicraft.pptx
+++ b/doc/Presentation_Minicraft.pptx
@@ -117,7 +117,7 @@
   </p:defaultTextStyle>
   <p:extLst>
     <p:ext uri="{EFAFB233-063F-42B5-8137-9DF3F51BA10A}">
-      <p15:sldGuideLst xmlns:p15="http://schemas.microsoft.com/office/powerpoint/2012/main">
+      <p15:sldGuideLst xmlns:p15="http://schemas.microsoft.com/office/powerpoint/2012/main" xmlns="">
         <p15:guide id="1" orient="horz" pos="2160">
           <p15:clr>
             <a:srgbClr val="A4A3A4"/>
@@ -552,7 +552,6 @@
               <a:rPr lang="fr-FR" baseline="0" dirty="0" smtClean="0"/>
               <a:t> très connu. </a:t>
             </a:r>
-            <a:endParaRPr lang="fr-FR" baseline="0" dirty="0" smtClean="0"/>
           </a:p>
           <a:p>
             <a:endParaRPr lang="fr-FR" baseline="0" dirty="0" smtClean="0"/>
@@ -669,11 +668,7 @@
             </a:r>
             <a:r>
               <a:rPr lang="fr-FR" baseline="0" smtClean="0"/>
-              <a:t>outils </a:t>
-            </a:r>
-            <a:r>
-              <a:rPr lang="fr-FR" baseline="0" smtClean="0"/>
-              <a:t>utilisés </a:t>
+              <a:t>outils utilisés </a:t>
             </a:r>
             <a:r>
               <a:rPr lang="fr-FR" baseline="0" dirty="0" smtClean="0"/>
@@ -778,11 +773,7 @@
           <a:p>
             <a:r>
               <a:rPr lang="fr-FR" baseline="0" dirty="0" smtClean="0"/>
-              <a:t>Objectif commun : </a:t>
-            </a:r>
-            <a:r>
-              <a:rPr lang="fr-FR" baseline="0" dirty="0" smtClean="0"/>
-              <a:t>Anthony</a:t>
+              <a:t>Objectif commun : Anthony</a:t>
             </a:r>
           </a:p>
           <a:p>
@@ -798,7 +789,7 @@
             </a:r>
             <a:r>
               <a:rPr lang="fr-FR" baseline="0" dirty="0" smtClean="0"/>
-              <a:t> : Découpage en sprint, user  stories , élaboration des tâches et priorités (</a:t>
+              <a:t> : Découpage en sprint, user stories, élaboration des tâches et priorités (</a:t>
             </a:r>
             <a:r>
               <a:rPr lang="fr-FR" baseline="0" dirty="0" err="1" smtClean="0"/>
@@ -906,15 +897,7 @@
             </a:r>
             <a:r>
               <a:rPr lang="fr-FR" baseline="0" dirty="0" smtClean="0"/>
-              <a:t> : Détailler le sprint1 + </a:t>
-            </a:r>
-            <a:r>
-              <a:rPr lang="fr-FR" baseline="0" dirty="0" smtClean="0"/>
-              <a:t>MONTRER </a:t>
-            </a:r>
-            <a:r>
-              <a:rPr lang="fr-FR" baseline="0" dirty="0" smtClean="0"/>
-              <a:t>le </a:t>
+              <a:t> : Détailler le sprint1 + MONTRER le </a:t>
             </a:r>
             <a:r>
               <a:rPr lang="fr-FR" baseline="0" dirty="0" err="1" smtClean="0"/>
@@ -922,11 +905,7 @@
             </a:r>
             <a:r>
               <a:rPr lang="fr-FR" baseline="0" dirty="0" smtClean="0"/>
-              <a:t> chart du </a:t>
-            </a:r>
-            <a:r>
-              <a:rPr lang="fr-FR" baseline="0" dirty="0" smtClean="0"/>
-              <a:t>sprint1</a:t>
+              <a:t> chart du sprint1</a:t>
             </a:r>
           </a:p>
           <a:p>
@@ -942,19 +921,14 @@
               <a:rPr lang="fr-FR" baseline="0" dirty="0" smtClean="0"/>
               <a:t> : 1P et gravité , déplacer, sauter, déposer retirer bloc, textures, collisions</a:t>
             </a:r>
+          </a:p>
+          <a:p>
             <a:endParaRPr lang="fr-FR" baseline="0" dirty="0" smtClean="0"/>
           </a:p>
           <a:p>
-            <a:endParaRPr lang="fr-FR" baseline="0" dirty="0" smtClean="0"/>
-          </a:p>
-          <a:p>
             <a:r>
               <a:rPr lang="fr-FR" baseline="0" dirty="0" smtClean="0"/>
-              <a:t>Sprint2 (Benjamin) : Tâches à effectuer </a:t>
-            </a:r>
-            <a:r>
-              <a:rPr lang="fr-FR" baseline="0" dirty="0" smtClean="0"/>
-              <a:t>+ MONTRER  </a:t>
+              <a:t>Sprint2 (Benjamin) : Tâches à effectuer + MONTRER  </a:t>
             </a:r>
             <a:r>
               <a:rPr lang="fr-FR" baseline="0" dirty="0" err="1" smtClean="0"/>
@@ -970,11 +944,7 @@
             </a:r>
             <a:r>
               <a:rPr lang="fr-FR" baseline="0" dirty="0" smtClean="0"/>
-              <a:t> du </a:t>
-            </a:r>
-            <a:r>
-              <a:rPr lang="fr-FR" baseline="0" dirty="0" smtClean="0"/>
-              <a:t>sprint2</a:t>
+              <a:t> du sprint2</a:t>
             </a:r>
           </a:p>
           <a:p>
@@ -1068,11 +1038,7 @@
           <a:p>
             <a:r>
               <a:rPr lang="fr-FR" dirty="0" smtClean="0"/>
-              <a:t>Outil : </a:t>
-            </a:r>
-            <a:r>
-              <a:rPr lang="fr-FR" dirty="0" smtClean="0"/>
-              <a:t>Anthony</a:t>
+              <a:t>Outil : Anthony</a:t>
             </a:r>
           </a:p>
           <a:p>
@@ -1094,13 +1060,29 @@
             </a:r>
             <a:r>
               <a:rPr lang="fr-FR" baseline="0" dirty="0" smtClean="0"/>
-              <a:t> 3 : moteur 3D pour réaliser des jeux (JOLI)</a:t>
-            </a:r>
-          </a:p>
-          <a:p>
+              <a:t> 3 : moteur 3D pour réaliser des jeux (JOLI), écrit 100% en Java, libre (licence BSD), utilise la bibliothèque LWJGL (</a:t>
+            </a:r>
+            <a:r>
+              <a:rPr lang="fr-FR" baseline="0" dirty="0" err="1" smtClean="0"/>
+              <a:t>Lightweight</a:t>
+            </a:r>
             <a:r>
               <a:rPr lang="fr-FR" baseline="0" dirty="0" smtClean="0"/>
-              <a:t>Possède son propre SDK pour développer (mais nous </a:t>
+              <a:t> Java Game Library, libre aussi sous Licence BSD) écrite en Java et en C pour communiquer avec OpenGL (bibliothèque native)</a:t>
+            </a:r>
+          </a:p>
+          <a:p>
+            <a:r>
+              <a:rPr lang="fr-FR" baseline="0" dirty="0" smtClean="0"/>
+              <a:t>Possède son propre SDK (une version modifiée de </a:t>
+            </a:r>
+            <a:r>
+              <a:rPr lang="fr-FR" baseline="0" dirty="0" err="1" smtClean="0"/>
+              <a:t>NetBeans</a:t>
+            </a:r>
+            <a:r>
+              <a:rPr lang="fr-FR" baseline="0" dirty="0" smtClean="0"/>
+              <a:t>) pour développer (mais nous </a:t>
             </a:r>
             <a:r>
               <a:rPr lang="fr-FR" baseline="0" dirty="0" err="1" smtClean="0"/>
@@ -1118,15 +1100,19 @@
             </a:r>
             <a:r>
               <a:rPr lang="fr-FR" baseline="0" dirty="0" err="1" smtClean="0"/>
-              <a:t>nifty</a:t>
+              <a:t>Nifty</a:t>
             </a:r>
             <a:r>
               <a:rPr lang="fr-FR" baseline="0" dirty="0" smtClean="0"/>
-              <a:t> pour écrans, </a:t>
+              <a:t> GUI pour les IHM, </a:t>
             </a:r>
             <a:r>
               <a:rPr lang="fr-FR" baseline="0" dirty="0" err="1" smtClean="0"/>
-              <a:t>etc</a:t>
+              <a:t>JBullet</a:t>
+            </a:r>
+            <a:r>
+              <a:rPr lang="fr-FR" baseline="0" dirty="0" smtClean="0"/>
+              <a:t> pour la physique</a:t>
             </a:r>
             <a:endParaRPr lang="fr-FR" dirty="0"/>
           </a:p>
@@ -1214,11 +1200,7 @@
           <a:p>
             <a:r>
               <a:rPr lang="fr-FR" dirty="0" smtClean="0"/>
-              <a:t>Diapo : </a:t>
-            </a:r>
-            <a:r>
-              <a:rPr lang="fr-FR" dirty="0" smtClean="0"/>
-              <a:t>Victor</a:t>
+              <a:t>Diapo : Victor</a:t>
             </a:r>
           </a:p>
           <a:p>
@@ -1458,19 +1440,7 @@
           <a:p>
             <a:r>
               <a:rPr lang="fr-FR" baseline="0" dirty="0" smtClean="0"/>
-              <a:t>A la fin de la diapo : </a:t>
-            </a:r>
-            <a:r>
-              <a:rPr lang="fr-FR" baseline="0" dirty="0" smtClean="0"/>
-              <a:t>DEMO </a:t>
-            </a:r>
-            <a:r>
-              <a:rPr lang="fr-FR" baseline="0" dirty="0" smtClean="0"/>
-              <a:t>par </a:t>
-            </a:r>
-            <a:r>
-              <a:rPr lang="fr-FR" baseline="0" dirty="0" smtClean="0"/>
-              <a:t>Benjamin </a:t>
+              <a:t>A la fin de la diapo : DEMO par Benjamin </a:t>
             </a:r>
             <a:endParaRPr lang="fr-FR" dirty="0"/>
           </a:p>
@@ -1635,11 +1605,7 @@
             </a:pPr>
             <a:r>
               <a:rPr lang="fr-FR" baseline="0" dirty="0" smtClean="0"/>
-              <a:t>Plus de </a:t>
-            </a:r>
-            <a:r>
-              <a:rPr lang="fr-FR" baseline="0" dirty="0" smtClean="0"/>
-              <a:t>formes possible</a:t>
+              <a:t>Plus de formes possible</a:t>
             </a:r>
           </a:p>
           <a:p>
@@ -1651,7 +1617,6 @@
               <a:rPr lang="fr-FR" baseline="0" dirty="0" smtClean="0"/>
               <a:t>Renommer et sauvegarder macros</a:t>
             </a:r>
-            <a:endParaRPr lang="fr-FR" baseline="0" dirty="0" smtClean="0"/>
           </a:p>
           <a:p>
             <a:pPr marL="171450" indent="-171450">
@@ -1675,19 +1640,7 @@
             </a:pPr>
             <a:r>
               <a:rPr lang="fr-FR" baseline="0" dirty="0" smtClean="0"/>
-              <a:t>Améliorer </a:t>
-            </a:r>
-            <a:r>
-              <a:rPr lang="fr-FR" baseline="0" dirty="0" smtClean="0"/>
-              <a:t>graphisme et design </a:t>
-            </a:r>
-            <a:r>
-              <a:rPr lang="fr-FR" baseline="0" dirty="0" smtClean="0"/>
-              <a:t>(Joueur + complet, prévisualisation des structures etc</a:t>
-            </a:r>
-            <a:r>
-              <a:rPr lang="fr-FR" baseline="0" dirty="0" smtClean="0"/>
-              <a:t>..)</a:t>
+              <a:t>Améliorer graphisme et design (Joueur + complet, prévisualisation des structures etc..)</a:t>
             </a:r>
           </a:p>
           <a:p>
@@ -5628,11 +5581,7 @@
           <a:p>
             <a:r>
               <a:rPr lang="fr-FR" dirty="0" smtClean="0"/>
-              <a:t>OLEA </a:t>
-            </a:r>
-            <a:r>
-              <a:rPr lang="fr-FR" dirty="0" smtClean="0"/>
-              <a:t>Anthony</a:t>
+              <a:t>OLEA Anthony</a:t>
             </a:r>
           </a:p>
           <a:p>
@@ -5644,18 +5593,12 @@
               <a:rPr lang="fr-FR" dirty="0" smtClean="0"/>
               <a:t>Benjamin</a:t>
             </a:r>
-            <a:endParaRPr lang="fr-FR" dirty="0" smtClean="0"/>
           </a:p>
           <a:p>
             <a:r>
               <a:rPr lang="fr-FR" dirty="0" smtClean="0"/>
-              <a:t>ESCARIEUX </a:t>
-            </a:r>
-            <a:r>
-              <a:rPr lang="fr-FR" dirty="0" smtClean="0"/>
-              <a:t>Guillaume</a:t>
-            </a:r>
-            <a:endParaRPr lang="fr-FR" dirty="0" smtClean="0"/>
+              <a:t>ESCARIEUX Guillaume</a:t>
+            </a:r>
           </a:p>
         </p:txBody>
       </p:sp>
@@ -5776,8 +5719,9 @@
           <a:p>
             <a:r>
               <a:rPr lang="fr-FR" dirty="0" smtClean="0"/>
-              <a:t>Contribution</a:t>
-            </a:r>
+              <a:t>Contributions</a:t>
+            </a:r>
+            <a:endParaRPr lang="fr-FR" dirty="0" smtClean="0"/>
           </a:p>
           <a:p>
             <a:r>
@@ -5955,21 +5899,29 @@
           <a:p>
             <a:r>
               <a:rPr lang="fr-FR" dirty="0" smtClean="0"/>
-              <a:t>Objectif commun</a:t>
+              <a:t>Objectifs communs</a:t>
             </a:r>
           </a:p>
           <a:p>
             <a:pPr lvl="1"/>
             <a:r>
               <a:rPr lang="fr-FR" dirty="0" smtClean="0"/>
-              <a:t>Utiliser et maitriser Git</a:t>
+              <a:t>Utiliser Git</a:t>
             </a:r>
           </a:p>
           <a:p>
             <a:pPr lvl="1"/>
             <a:r>
               <a:rPr lang="fr-FR" dirty="0" smtClean="0"/>
-              <a:t>Suivre la méthode Scrum</a:t>
+              <a:t>Suivre la méthode </a:t>
+            </a:r>
+            <a:r>
+              <a:rPr lang="fr-FR" dirty="0" err="1" smtClean="0"/>
+              <a:t>Scrum</a:t>
+            </a:r>
+            <a:r>
+              <a:rPr lang="fr-FR" dirty="0" smtClean="0"/>
+              <a:t> et des principes agiles</a:t>
             </a:r>
           </a:p>
           <a:p>
@@ -6331,8 +6283,12 @@
           <a:p>
             <a:pPr lvl="1"/>
             <a:r>
+              <a:rPr lang="fr-FR" dirty="0" err="1" smtClean="0"/>
+              <a:t>JMonkeyEngine</a:t>
+            </a:r>
+            <a:r>
               <a:rPr lang="fr-FR" dirty="0" smtClean="0"/>
-              <a:t>JMonkeyEngine</a:t>
+              <a:t> version </a:t>
             </a:r>
             <a:r>
               <a:rPr lang="fr-FR" dirty="0" smtClean="0">
@@ -6360,7 +6316,7 @@
       </p:sp>
       <p:pic>
         <p:nvPicPr>
-          <p:cNvPr id="1026" name="Picture 2" descr="C:\Users\Benjamin\Documents\COURS_EMN\UV_MiniProjet\1675386327_64af841db7_o.jpg"/>
+          <p:cNvPr id="1027" name="Picture 3" descr="C:\Users\Benjamin\Documents\COURS_EMN\UV_MiniProjet\Spirits3.jpg"/>
           <p:cNvPicPr>
             <a:picLocks noChangeAspect="1" noChangeArrowheads="1"/>
           </p:cNvPicPr>
@@ -6381,8 +6337,8 @@
         </p:blipFill>
         <p:spPr bwMode="auto">
           <a:xfrm>
-            <a:off x="6444208" y="1628800"/>
-            <a:ext cx="2362338" cy="2362338"/>
+            <a:off x="586684" y="3205722"/>
+            <a:ext cx="5616624" cy="3510390"/>
           </a:xfrm>
           <a:prstGeom prst="rect">
             <a:avLst/>
@@ -6401,7 +6357,7 @@
       </p:pic>
       <p:pic>
         <p:nvPicPr>
-          <p:cNvPr id="1027" name="Picture 3" descr="C:\Users\Benjamin\Documents\COURS_EMN\UV_MiniProjet\Spirits3.jpg"/>
+          <p:cNvPr id="4" name="Picture 2" descr="https://encrypted-tbn0.gstatic.com/images?q=tbn:ANd9GcRcccbySJWa0zb4lxGgr6otPIlVPBGaGoyujSRWmEmLXzBnZ6ak"/>
           <p:cNvPicPr>
             <a:picLocks noChangeAspect="1" noChangeArrowheads="1"/>
           </p:cNvPicPr>
@@ -6422,8 +6378,8 @@
         </p:blipFill>
         <p:spPr bwMode="auto">
           <a:xfrm>
-            <a:off x="586684" y="3205722"/>
-            <a:ext cx="5616624" cy="3510390"/>
+            <a:off x="6660232" y="1772816"/>
+            <a:ext cx="2143125" cy="2143125"/>
           </a:xfrm>
           <a:prstGeom prst="rect">
             <a:avLst/>

</xml_diff>